<commit_message>
LTI batches help for all TOC
</commit_message>
<xml_diff>
--- a/LTI_ASPNET_MVC/PPT/Validators.pptx
+++ b/LTI_ASPNET_MVC/PPT/Validators.pptx
@@ -9,8 +9,7 @@
     <p:sldId id="262" r:id="rId3"/>
     <p:sldId id="260" r:id="rId4"/>
     <p:sldId id="263" r:id="rId5"/>
-    <p:sldId id="261" r:id="rId6"/>
-    <p:sldId id="259" r:id="rId7"/>
+    <p:sldId id="259" r:id="rId6"/>
   </p:sldIdLst>
   <p:sldSz cx="12192000" cy="6858000"/>
   <p:notesSz cx="6858000" cy="9144000"/>
@@ -747,7 +746,7 @@
           <a:p>
             <a:fld id="{D2474CCF-98B4-411A-8810-C31E8C29E19B}" type="datetimeFigureOut">
               <a:rPr lang="en-US" smtClean="0"/>
-              <a:t>7/17/2022</a:t>
+              <a:t>9/27/2022</a:t>
             </a:fld>
             <a:endParaRPr lang="en-US"/>
           </a:p>
@@ -1175,7 +1174,7 @@
           <a:p>
             <a:fld id="{D2474CCF-98B4-411A-8810-C31E8C29E19B}" type="datetimeFigureOut">
               <a:rPr lang="en-US" smtClean="0"/>
-              <a:t>7/17/2022</a:t>
+              <a:t>9/27/2022</a:t>
             </a:fld>
             <a:endParaRPr lang="en-US"/>
           </a:p>
@@ -1383,7 +1382,7 @@
           <a:p>
             <a:fld id="{D2474CCF-98B4-411A-8810-C31E8C29E19B}" type="datetimeFigureOut">
               <a:rPr lang="en-US" smtClean="0"/>
-              <a:t>7/17/2022</a:t>
+              <a:t>9/27/2022</a:t>
             </a:fld>
             <a:endParaRPr lang="en-US"/>
           </a:p>
@@ -2159,7 +2158,7 @@
           <a:p>
             <a:fld id="{D2474CCF-98B4-411A-8810-C31E8C29E19B}" type="datetimeFigureOut">
               <a:rPr lang="en-US" smtClean="0"/>
-              <a:t>7/17/2022</a:t>
+              <a:t>9/27/2022</a:t>
             </a:fld>
             <a:endParaRPr lang="en-US"/>
           </a:p>
@@ -2837,7 +2836,7 @@
           <a:p>
             <a:fld id="{D2474CCF-98B4-411A-8810-C31E8C29E19B}" type="datetimeFigureOut">
               <a:rPr lang="en-US" smtClean="0"/>
-              <a:t>7/17/2022</a:t>
+              <a:t>9/27/2022</a:t>
             </a:fld>
             <a:endParaRPr lang="en-US"/>
           </a:p>
@@ -3528,7 +3527,7 @@
           <a:p>
             <a:fld id="{D2474CCF-98B4-411A-8810-C31E8C29E19B}" type="datetimeFigureOut">
               <a:rPr lang="en-US" smtClean="0"/>
-              <a:t>7/17/2022</a:t>
+              <a:t>9/27/2022</a:t>
             </a:fld>
             <a:endParaRPr lang="en-US"/>
           </a:p>
@@ -4330,7 +4329,7 @@
           <a:p>
             <a:fld id="{D2474CCF-98B4-411A-8810-C31E8C29E19B}" type="datetimeFigureOut">
               <a:rPr lang="en-US" smtClean="0"/>
-              <a:t>7/17/2022</a:t>
+              <a:t>9/27/2022</a:t>
             </a:fld>
             <a:endParaRPr lang="en-US"/>
           </a:p>
@@ -4861,7 +4860,7 @@
           <a:p>
             <a:fld id="{D2474CCF-98B4-411A-8810-C31E8C29E19B}" type="datetimeFigureOut">
               <a:rPr lang="en-US" smtClean="0"/>
-              <a:t>7/17/2022</a:t>
+              <a:t>9/27/2022</a:t>
             </a:fld>
             <a:endParaRPr lang="en-US"/>
           </a:p>
@@ -5364,7 +5363,7 @@
           <a:p>
             <a:fld id="{D2474CCF-98B4-411A-8810-C31E8C29E19B}" type="datetimeFigureOut">
               <a:rPr lang="en-US" smtClean="0"/>
-              <a:t>7/17/2022</a:t>
+              <a:t>9/27/2022</a:t>
             </a:fld>
             <a:endParaRPr lang="en-US"/>
           </a:p>
@@ -5675,7 +5674,7 @@
           <a:p>
             <a:fld id="{D2474CCF-98B4-411A-8810-C31E8C29E19B}" type="datetimeFigureOut">
               <a:rPr lang="en-US" smtClean="0"/>
-              <a:t>7/17/2022</a:t>
+              <a:t>9/27/2022</a:t>
             </a:fld>
             <a:endParaRPr lang="en-US"/>
           </a:p>
@@ -5966,7 +5965,7 @@
           <a:p>
             <a:fld id="{D2474CCF-98B4-411A-8810-C31E8C29E19B}" type="datetimeFigureOut">
               <a:rPr lang="en-US" smtClean="0"/>
-              <a:t>7/17/2022</a:t>
+              <a:t>9/27/2022</a:t>
             </a:fld>
             <a:endParaRPr lang="en-US"/>
           </a:p>
@@ -6207,7 +6206,7 @@
           <a:p>
             <a:fld id="{D2474CCF-98B4-411A-8810-C31E8C29E19B}" type="datetimeFigureOut">
               <a:rPr lang="en-US" smtClean="0"/>
-              <a:t>7/17/2022</a:t>
+              <a:t>9/27/2022</a:t>
             </a:fld>
             <a:endParaRPr lang="en-US"/>
           </a:p>
@@ -7370,7 +7369,7 @@
         </p:nvSpPr>
         <p:spPr bwMode="auto">
           <a:xfrm>
-            <a:off x="584681" y="1130598"/>
+            <a:off x="842134" y="1139475"/>
             <a:ext cx="7795839" cy="3170099"/>
           </a:xfrm>
           <a:prstGeom prst="rect">
@@ -7558,7 +7557,7 @@
               <a:tabLst/>
             </a:pPr>
             <a:r>
-              <a:rPr kumimoji="0" lang="en-US" altLang="en-US" sz="2000" b="0" i="0" u="none" strike="noStrike" cap="none" normalizeH="0" baseline="0">
+              <a:rPr kumimoji="0" lang="en-US" altLang="en-US" sz="2000" b="0" i="0" u="none" strike="noStrike" cap="none" normalizeH="0" baseline="0" dirty="0">
                 <a:ln>
                   <a:noFill/>
                 </a:ln>
@@ -7571,7 +7570,7 @@
               <a:t>Validation attributes work for most validation needs. However, some validation rules are specific to your business, as they’re not just generic data validation such as ensuring a field is required or that it conforms to a range of values. For these scenarios, custom validation attributes are a great solution. Creating your own custom validation attributes in MVC is easy. Just inherit from the </a:t>
             </a:r>
             <a:r>
-              <a:rPr kumimoji="0" lang="en-US" altLang="en-US" sz="2000" b="0" i="0" u="none" strike="noStrike" cap="none" normalizeH="0" baseline="0">
+              <a:rPr kumimoji="0" lang="en-US" altLang="en-US" sz="2000" b="0" i="0" u="none" strike="noStrike" cap="none" normalizeH="0" baseline="0" dirty="0" err="1">
                 <a:ln>
                   <a:noFill/>
                 </a:ln>
@@ -7584,7 +7583,7 @@
               <a:t>ValidationAttribute</a:t>
             </a:r>
             <a:r>
-              <a:rPr kumimoji="0" lang="en-US" altLang="en-US" sz="2000" b="0" i="0" u="none" strike="noStrike" cap="none" normalizeH="0" baseline="0">
+              <a:rPr kumimoji="0" lang="en-US" altLang="en-US" sz="2000" b="0" i="0" u="none" strike="noStrike" cap="none" normalizeH="0" baseline="0" dirty="0">
                 <a:ln>
                   <a:noFill/>
                 </a:ln>
@@ -7597,7 +7596,7 @@
               <a:t>, and override the </a:t>
             </a:r>
             <a:r>
-              <a:rPr kumimoji="0" lang="en-US" altLang="en-US" sz="2000" b="0" i="0" u="none" strike="noStrike" cap="none" normalizeH="0" baseline="0">
+              <a:rPr kumimoji="0" lang="en-US" altLang="en-US" sz="2000" b="0" i="0" u="none" strike="noStrike" cap="none" normalizeH="0" baseline="0" dirty="0" err="1">
                 <a:ln>
                   <a:noFill/>
                 </a:ln>
@@ -7610,7 +7609,7 @@
               <a:t>IsValid</a:t>
             </a:r>
             <a:r>
-              <a:rPr kumimoji="0" lang="en-US" altLang="en-US" sz="2000" b="0" i="0" u="none" strike="noStrike" cap="none" normalizeH="0" baseline="0">
+              <a:rPr kumimoji="0" lang="en-US" altLang="en-US" sz="2000" b="0" i="0" u="none" strike="noStrike" cap="none" normalizeH="0" baseline="0" dirty="0">
                 <a:ln>
                   <a:noFill/>
                 </a:ln>
@@ -7623,7 +7622,7 @@
               <a:t> method. The </a:t>
             </a:r>
             <a:r>
-              <a:rPr kumimoji="0" lang="en-US" altLang="en-US" sz="2000" b="0" i="0" u="none" strike="noStrike" cap="none" normalizeH="0" baseline="0">
+              <a:rPr kumimoji="0" lang="en-US" altLang="en-US" sz="2000" b="0" i="0" u="none" strike="noStrike" cap="none" normalizeH="0" baseline="0" dirty="0" err="1">
                 <a:ln>
                   <a:noFill/>
                 </a:ln>
@@ -7636,7 +7635,7 @@
               <a:t>IsValid</a:t>
             </a:r>
             <a:r>
-              <a:rPr kumimoji="0" lang="en-US" altLang="en-US" sz="2000" b="0" i="0" u="none" strike="noStrike" cap="none" normalizeH="0" baseline="0">
+              <a:rPr kumimoji="0" lang="en-US" altLang="en-US" sz="2000" b="0" i="0" u="none" strike="noStrike" cap="none" normalizeH="0" baseline="0" dirty="0">
                 <a:ln>
                   <a:noFill/>
                 </a:ln>
@@ -7649,7 +7648,7 @@
               <a:t> method accepts two parameters, the first is an object named </a:t>
             </a:r>
             <a:r>
-              <a:rPr kumimoji="0" lang="en-US" altLang="en-US" sz="2000" b="0" i="1" u="none" strike="noStrike" cap="none" normalizeH="0" baseline="0">
+              <a:rPr kumimoji="0" lang="en-US" altLang="en-US" sz="2000" b="0" i="1" u="none" strike="noStrike" cap="none" normalizeH="0" baseline="0" dirty="0">
                 <a:ln>
                   <a:noFill/>
                 </a:ln>
@@ -7662,7 +7661,7 @@
               <a:t>value</a:t>
             </a:r>
             <a:r>
-              <a:rPr kumimoji="0" lang="en-US" altLang="en-US" sz="2000" b="0" i="0" u="none" strike="noStrike" cap="none" normalizeH="0" baseline="0">
+              <a:rPr kumimoji="0" lang="en-US" altLang="en-US" sz="2000" b="0" i="0" u="none" strike="noStrike" cap="none" normalizeH="0" baseline="0" dirty="0">
                 <a:ln>
                   <a:noFill/>
                 </a:ln>
@@ -7675,7 +7674,7 @@
               <a:t> and the second is a </a:t>
             </a:r>
             <a:r>
-              <a:rPr kumimoji="0" lang="en-US" altLang="en-US" sz="2000" b="0" i="0" u="none" strike="noStrike" cap="none" normalizeH="0" baseline="0">
+              <a:rPr kumimoji="0" lang="en-US" altLang="en-US" sz="2000" b="0" i="0" u="none" strike="noStrike" cap="none" normalizeH="0" baseline="0" dirty="0" err="1">
                 <a:ln>
                   <a:noFill/>
                 </a:ln>
@@ -7688,7 +7687,7 @@
               <a:t>ValidationContext</a:t>
             </a:r>
             <a:r>
-              <a:rPr kumimoji="0" lang="en-US" altLang="en-US" sz="2000" b="0" i="0" u="none" strike="noStrike" cap="none" normalizeH="0" baseline="0">
+              <a:rPr kumimoji="0" lang="en-US" altLang="en-US" sz="2000" b="0" i="0" u="none" strike="noStrike" cap="none" normalizeH="0" baseline="0" dirty="0">
                 <a:ln>
                   <a:noFill/>
                 </a:ln>
@@ -7701,7 +7700,7 @@
               <a:t> object named </a:t>
             </a:r>
             <a:r>
-              <a:rPr kumimoji="0" lang="en-US" altLang="en-US" sz="2000" b="0" i="1" u="none" strike="noStrike" cap="none" normalizeH="0" baseline="0">
+              <a:rPr kumimoji="0" lang="en-US" altLang="en-US" sz="2000" b="0" i="1" u="none" strike="noStrike" cap="none" normalizeH="0" baseline="0" dirty="0" err="1">
                 <a:ln>
                   <a:noFill/>
                 </a:ln>
@@ -7714,7 +7713,7 @@
               <a:t>validationContext</a:t>
             </a:r>
             <a:r>
-              <a:rPr kumimoji="0" lang="en-US" altLang="en-US" sz="2000" b="0" i="0" u="none" strike="noStrike" cap="none" normalizeH="0" baseline="0">
+              <a:rPr kumimoji="0" lang="en-US" altLang="en-US" sz="2000" b="0" i="0" u="none" strike="noStrike" cap="none" normalizeH="0" baseline="0" dirty="0">
                 <a:ln>
                   <a:noFill/>
                 </a:ln>
@@ -7727,7 +7726,7 @@
               <a:t>. </a:t>
             </a:r>
             <a:r>
-              <a:rPr kumimoji="0" lang="en-US" altLang="en-US" sz="2000" b="0" i="1" u="none" strike="noStrike" cap="none" normalizeH="0" baseline="0">
+              <a:rPr kumimoji="0" lang="en-US" altLang="en-US" sz="2000" b="0" i="1" u="none" strike="noStrike" cap="none" normalizeH="0" baseline="0" dirty="0">
                 <a:ln>
                   <a:noFill/>
                 </a:ln>
@@ -7740,7 +7739,7 @@
               <a:t>Value</a:t>
             </a:r>
             <a:r>
-              <a:rPr kumimoji="0" lang="en-US" altLang="en-US" sz="2000" b="0" i="0" u="none" strike="noStrike" cap="none" normalizeH="0" baseline="0">
+              <a:rPr kumimoji="0" lang="en-US" altLang="en-US" sz="2000" b="0" i="0" u="none" strike="noStrike" cap="none" normalizeH="0" baseline="0" dirty="0">
                 <a:ln>
                   <a:noFill/>
                 </a:ln>
@@ -7753,7 +7752,7 @@
               <a:t> refers to the actual value from the field that your custom validator is validating.</a:t>
             </a:r>
             <a:r>
-              <a:rPr kumimoji="0" lang="en-US" altLang="en-US" sz="2000" b="0" i="0" u="none" strike="noStrike" cap="none" normalizeH="0" baseline="0">
+              <a:rPr kumimoji="0" lang="en-US" altLang="en-US" sz="2000" b="0" i="0" u="none" strike="noStrike" cap="none" normalizeH="0" baseline="0" dirty="0">
                 <a:ln>
                   <a:noFill/>
                 </a:ln>
@@ -8098,7 +8097,7 @@
         </p:nvSpPr>
         <p:spPr bwMode="auto">
           <a:xfrm>
-            <a:off x="701335" y="2634144"/>
+            <a:off x="565211" y="2862178"/>
             <a:ext cx="11061577" cy="3157788"/>
           </a:xfrm>
           <a:prstGeom prst="rect">
@@ -9209,89 +9208,6 @@
 </file>
 
 <file path=ppt/slides/slide5.xml><?xml version="1.0" encoding="utf-8"?>
-<p:sld xmlns:a="http://schemas.openxmlformats.org/drawingml/2006/main" xmlns:r="http://schemas.openxmlformats.org/officeDocument/2006/relationships" xmlns:p="http://schemas.openxmlformats.org/presentationml/2006/main">
-  <p:cSld>
-    <p:spTree>
-      <p:nvGrpSpPr>
-        <p:cNvPr id="1" name=""/>
-        <p:cNvGrpSpPr/>
-        <p:nvPr/>
-      </p:nvGrpSpPr>
-      <p:grpSpPr>
-        <a:xfrm>
-          <a:off x="0" y="0"/>
-          <a:ext cx="0" cy="0"/>
-          <a:chOff x="0" y="0"/>
-          <a:chExt cx="0" cy="0"/>
-        </a:xfrm>
-      </p:grpSpPr>
-      <p:sp>
-        <p:nvSpPr>
-          <p:cNvPr id="2" name="Title 1">
-            <a:extLst>
-              <a:ext uri="{FF2B5EF4-FFF2-40B4-BE49-F238E27FC236}">
-                <a16:creationId xmlns:a16="http://schemas.microsoft.com/office/drawing/2014/main" id="{45F33AFC-C220-4038-ACF0-E5D4B3B57FD0}"/>
-              </a:ext>
-            </a:extLst>
-          </p:cNvPr>
-          <p:cNvSpPr>
-            <a:spLocks noGrp="1"/>
-          </p:cNvSpPr>
-          <p:nvPr>
-            <p:ph type="title"/>
-          </p:nvPr>
-        </p:nvSpPr>
-        <p:spPr/>
-        <p:txBody>
-          <a:bodyPr/>
-          <a:lstStyle/>
-          <a:p>
-            <a:r>
-              <a:rPr lang="en-US" dirty="0"/>
-              <a:t>Slides</a:t>
-            </a:r>
-          </a:p>
-        </p:txBody>
-      </p:sp>
-      <p:sp>
-        <p:nvSpPr>
-          <p:cNvPr id="4" name="Content Placeholder 3">
-            <a:extLst>
-              <a:ext uri="{FF2B5EF4-FFF2-40B4-BE49-F238E27FC236}">
-                <a16:creationId xmlns:a16="http://schemas.microsoft.com/office/drawing/2014/main" id="{0146DD26-E59E-4BAA-A74F-05E44312CC29}"/>
-              </a:ext>
-            </a:extLst>
-          </p:cNvPr>
-          <p:cNvSpPr>
-            <a:spLocks noGrp="1"/>
-          </p:cNvSpPr>
-          <p:nvPr>
-            <p:ph idx="1"/>
-          </p:nvPr>
-        </p:nvSpPr>
-        <p:spPr/>
-        <p:txBody>
-          <a:bodyPr/>
-          <a:lstStyle/>
-          <a:p>
-            <a:endParaRPr lang="en-IN"/>
-          </a:p>
-        </p:txBody>
-      </p:sp>
-    </p:spTree>
-    <p:extLst>
-      <p:ext uri="{BB962C8B-B14F-4D97-AF65-F5344CB8AC3E}">
-        <p14:creationId xmlns:p14="http://schemas.microsoft.com/office/powerpoint/2010/main" val="3854174728"/>
-      </p:ext>
-    </p:extLst>
-  </p:cSld>
-  <p:clrMapOvr>
-    <a:masterClrMapping/>
-  </p:clrMapOvr>
-</p:sld>
-</file>
-
-<file path=ppt/slides/slide6.xml><?xml version="1.0" encoding="utf-8"?>
 <p:sld xmlns:a="http://schemas.openxmlformats.org/drawingml/2006/main" xmlns:r="http://schemas.openxmlformats.org/officeDocument/2006/relationships" xmlns:p="http://schemas.openxmlformats.org/presentationml/2006/main">
   <p:cSld>
     <p:spTree>

</xml_diff>